<commit_message>
Week 4 slide update
</commit_message>
<xml_diff>
--- a/in_class_slides/geog4300_W04-1 Classification and descriptive stats.pptx
+++ b/in_class_slides/geog4300_W04-1 Classification and descriptive stats.pptx
@@ -5,7 +5,7 @@
     <p:sldMasterId id="2147483660" r:id="rId1"/>
   </p:sldMasterIdLst>
   <p:notesMasterIdLst>
-    <p:notesMasterId r:id="rId12"/>
+    <p:notesMasterId r:id="rId13"/>
   </p:notesMasterIdLst>
   <p:sldIdLst>
     <p:sldId id="256" r:id="rId2"/>
@@ -16,8 +16,9 @@
     <p:sldId id="286" r:id="rId7"/>
     <p:sldId id="278" r:id="rId8"/>
     <p:sldId id="279" r:id="rId9"/>
-    <p:sldId id="280" r:id="rId10"/>
-    <p:sldId id="291" r:id="rId11"/>
+    <p:sldId id="292" r:id="rId10"/>
+    <p:sldId id="280" r:id="rId11"/>
+    <p:sldId id="291" r:id="rId12"/>
   </p:sldIdLst>
   <p:sldSz cx="12192000" cy="6858000"/>
   <p:notesSz cx="6858000" cy="9144000"/>
@@ -206,7 +207,7 @@
           <a:p>
             <a:fld id="{F1C23026-85D4-48E8-9219-18000F688023}" type="datetimeFigureOut">
               <a:rPr lang="en-US" smtClean="0"/>
-              <a:t>9/6/2023</a:t>
+              <a:t>9/12/2023</a:t>
             </a:fld>
             <a:endParaRPr lang="en-US"/>
           </a:p>
@@ -1156,7 +1157,7 @@
     </p:spTree>
     <p:extLst>
       <p:ext uri="{BB962C8B-B14F-4D97-AF65-F5344CB8AC3E}">
-        <p14:creationId xmlns:p14="http://schemas.microsoft.com/office/powerpoint/2010/main" val="4132010899"/>
+        <p14:creationId xmlns:p14="http://schemas.microsoft.com/office/powerpoint/2010/main" val="456445929"/>
       </p:ext>
     </p:extLst>
   </p:cSld>
@@ -1387,6 +1388,237 @@
     </p:spTree>
     <p:extLst>
       <p:ext uri="{BB962C8B-B14F-4D97-AF65-F5344CB8AC3E}">
+        <p14:creationId xmlns:p14="http://schemas.microsoft.com/office/powerpoint/2010/main" val="4132010899"/>
+      </p:ext>
+    </p:extLst>
+  </p:cSld>
+  <p:clrMapOvr>
+    <a:masterClrMapping/>
+  </p:clrMapOvr>
+</p:notes>
+</file>
+
+<file path=ppt/notesSlides/notesSlide5.xml><?xml version="1.0" encoding="utf-8"?>
+<p:notes xmlns:a="http://schemas.openxmlformats.org/drawingml/2006/main" xmlns:r="http://schemas.openxmlformats.org/officeDocument/2006/relationships" xmlns:p="http://schemas.openxmlformats.org/presentationml/2006/main" showMasterSp="0" showMasterPhAnim="0">
+  <p:cSld>
+    <p:spTree>
+      <p:nvGrpSpPr>
+        <p:cNvPr id="1" name="Shape 114"/>
+        <p:cNvGrpSpPr/>
+        <p:nvPr/>
+      </p:nvGrpSpPr>
+      <p:grpSpPr>
+        <a:xfrm>
+          <a:off x="0" y="0"/>
+          <a:ext cx="0" cy="0"/>
+          <a:chOff x="0" y="0"/>
+          <a:chExt cx="0" cy="0"/>
+        </a:xfrm>
+      </p:grpSpPr>
+      <p:sp>
+        <p:nvSpPr>
+          <p:cNvPr id="115" name="Shape 115"/>
+          <p:cNvSpPr>
+            <a:spLocks noGrp="1" noRot="1" noChangeAspect="1"/>
+          </p:cNvSpPr>
+          <p:nvPr>
+            <p:ph type="sldImg" idx="2"/>
+          </p:nvPr>
+        </p:nvSpPr>
+        <p:spPr>
+          <a:xfrm>
+            <a:off x="381000" y="685800"/>
+            <a:ext cx="6096000" cy="3429000"/>
+          </a:xfrm>
+          <a:custGeom>
+            <a:avLst/>
+            <a:gdLst/>
+            <a:ahLst/>
+            <a:cxnLst/>
+            <a:rect l="0" t="0" r="0" b="0"/>
+            <a:pathLst>
+              <a:path w="120000" h="120000" extrusionOk="0">
+                <a:moveTo>
+                  <a:pt x="0" y="0"/>
+                </a:moveTo>
+                <a:lnTo>
+                  <a:pt x="120000" y="0"/>
+                </a:lnTo>
+                <a:lnTo>
+                  <a:pt x="120000" y="120000"/>
+                </a:lnTo>
+                <a:lnTo>
+                  <a:pt x="0" y="120000"/>
+                </a:lnTo>
+                <a:close/>
+              </a:path>
+            </a:pathLst>
+          </a:custGeom>
+          <a:noFill/>
+          <a:ln w="12700" cap="flat" cmpd="sng">
+            <a:solidFill>
+              <a:srgbClr val="000000"/>
+            </a:solidFill>
+            <a:prstDash val="solid"/>
+            <a:round/>
+            <a:headEnd type="none" w="med" len="med"/>
+            <a:tailEnd type="none" w="med" len="med"/>
+          </a:ln>
+        </p:spPr>
+      </p:sp>
+      <p:sp>
+        <p:nvSpPr>
+          <p:cNvPr id="116" name="Shape 116"/>
+          <p:cNvSpPr txBox="1">
+            <a:spLocks noGrp="1"/>
+          </p:cNvSpPr>
+          <p:nvPr>
+            <p:ph type="body" idx="1"/>
+          </p:nvPr>
+        </p:nvSpPr>
+        <p:spPr>
+          <a:xfrm>
+            <a:off x="685800" y="4343400"/>
+            <a:ext cx="5486399" cy="4114800"/>
+          </a:xfrm>
+          <a:prstGeom prst="rect">
+            <a:avLst/>
+          </a:prstGeom>
+          <a:noFill/>
+          <a:ln>
+            <a:noFill/>
+          </a:ln>
+        </p:spPr>
+        <p:txBody>
+          <a:bodyPr lIns="91425" tIns="45700" rIns="91425" bIns="45700" anchor="t" anchorCtr="0">
+            <a:noAutofit/>
+          </a:bodyPr>
+          <a:lstStyle/>
+          <a:p>
+            <a:pPr marL="0" marR="0" lvl="0" indent="0" algn="l" rtl="0">
+              <a:spcBef>
+                <a:spcPts val="0"/>
+              </a:spcBef>
+              <a:buSzPct val="25000"/>
+              <a:buNone/>
+            </a:pPr>
+            <a:r>
+              <a:rPr lang="en-US" sz="1200" b="0" i="0" u="none" strike="noStrike" cap="none">
+                <a:solidFill>
+                  <a:schemeClr val="dk1"/>
+                </a:solidFill>
+                <a:latin typeface="Calibri"/>
+                <a:ea typeface="Calibri"/>
+                <a:cs typeface="Calibri"/>
+                <a:sym typeface="Calibri"/>
+              </a:rPr>
+              <a:t>Depending your approach, classification methods can paint very different pictures of the same data points.</a:t>
+            </a:r>
+          </a:p>
+          <a:p>
+            <a:pPr marL="0" marR="0" lvl="0" indent="0" algn="l" rtl="0">
+              <a:spcBef>
+                <a:spcPts val="0"/>
+              </a:spcBef>
+              <a:buSzPct val="25000"/>
+              <a:buNone/>
+            </a:pPr>
+            <a:endParaRPr sz="1200" b="0" i="0" u="none" strike="noStrike" cap="none">
+              <a:solidFill>
+                <a:schemeClr val="dk1"/>
+              </a:solidFill>
+              <a:latin typeface="Calibri"/>
+              <a:ea typeface="Calibri"/>
+              <a:cs typeface="Calibri"/>
+              <a:sym typeface="Calibri"/>
+            </a:endParaRPr>
+          </a:p>
+          <a:p>
+            <a:pPr marL="0" marR="0" lvl="0" indent="0" algn="l" rtl="0">
+              <a:spcBef>
+                <a:spcPts val="0"/>
+              </a:spcBef>
+              <a:buSzPct val="25000"/>
+              <a:buNone/>
+            </a:pPr>
+            <a:r>
+              <a:rPr lang="en-US" sz="1200" b="0" i="0" u="none" strike="noStrike" cap="none">
+                <a:solidFill>
+                  <a:schemeClr val="dk1"/>
+                </a:solidFill>
+                <a:latin typeface="Calibri"/>
+                <a:ea typeface="Calibri"/>
+                <a:cs typeface="Calibri"/>
+                <a:sym typeface="Calibri"/>
+              </a:rPr>
+              <a:t>How might we interpret the natural breaks map differently from the quantiles map here?</a:t>
+            </a:r>
+          </a:p>
+        </p:txBody>
+      </p:sp>
+      <p:sp>
+        <p:nvSpPr>
+          <p:cNvPr id="117" name="Shape 117"/>
+          <p:cNvSpPr txBox="1">
+            <a:spLocks noGrp="1"/>
+          </p:cNvSpPr>
+          <p:nvPr>
+            <p:ph type="sldNum" idx="12"/>
+          </p:nvPr>
+        </p:nvSpPr>
+        <p:spPr>
+          <a:xfrm>
+            <a:off x="3884612" y="8685213"/>
+            <a:ext cx="2971799" cy="457200"/>
+          </a:xfrm>
+          <a:prstGeom prst="rect">
+            <a:avLst/>
+          </a:prstGeom>
+          <a:noFill/>
+          <a:ln>
+            <a:noFill/>
+          </a:ln>
+        </p:spPr>
+        <p:txBody>
+          <a:bodyPr lIns="91425" tIns="45700" rIns="91425" bIns="45700" anchor="b" anchorCtr="0">
+            <a:noAutofit/>
+          </a:bodyPr>
+          <a:lstStyle/>
+          <a:p>
+            <a:pPr marL="0" marR="0" lvl="0" indent="0" algn="r" rtl="0">
+              <a:spcBef>
+                <a:spcPts val="0"/>
+              </a:spcBef>
+              <a:buSzPct val="25000"/>
+              <a:buNone/>
+            </a:pPr>
+            <a:fld id="{00000000-1234-1234-1234-123412341234}" type="slidenum">
+              <a:rPr lang="en-US" sz="1200">
+                <a:solidFill>
+                  <a:schemeClr val="dk1"/>
+                </a:solidFill>
+                <a:latin typeface="Calibri"/>
+                <a:ea typeface="Calibri"/>
+                <a:cs typeface="Calibri"/>
+                <a:sym typeface="Calibri"/>
+              </a:rPr>
+              <a:t>11</a:t>
+            </a:fld>
+            <a:endParaRPr lang="en-US" sz="1200">
+              <a:solidFill>
+                <a:schemeClr val="dk1"/>
+              </a:solidFill>
+              <a:latin typeface="Calibri"/>
+              <a:ea typeface="Calibri"/>
+              <a:cs typeface="Calibri"/>
+              <a:sym typeface="Calibri"/>
+            </a:endParaRPr>
+          </a:p>
+        </p:txBody>
+      </p:sp>
+    </p:spTree>
+    <p:extLst>
+      <p:ext uri="{BB962C8B-B14F-4D97-AF65-F5344CB8AC3E}">
         <p14:creationId xmlns:p14="http://schemas.microsoft.com/office/powerpoint/2010/main" val="746891027"/>
       </p:ext>
     </p:extLst>
@@ -1582,7 +1814,7 @@
           <a:p>
             <a:fld id="{93C8B963-0F36-48FC-991E-AA63861DA924}" type="datetimeFigureOut">
               <a:rPr lang="en-US" smtClean="0"/>
-              <a:t>9/6/2023</a:t>
+              <a:t>9/12/2023</a:t>
             </a:fld>
             <a:endParaRPr lang="en-US"/>
           </a:p>
@@ -1880,7 +2112,7 @@
           <a:p>
             <a:fld id="{93C8B963-0F36-48FC-991E-AA63861DA924}" type="datetimeFigureOut">
               <a:rPr lang="en-US" smtClean="0"/>
-              <a:t>9/6/2023</a:t>
+              <a:t>9/12/2023</a:t>
             </a:fld>
             <a:endParaRPr lang="en-US"/>
           </a:p>
@@ -2072,7 +2304,7 @@
           <a:p>
             <a:fld id="{93C8B963-0F36-48FC-991E-AA63861DA924}" type="datetimeFigureOut">
               <a:rPr lang="en-US" smtClean="0"/>
-              <a:t>9/6/2023</a:t>
+              <a:t>9/12/2023</a:t>
             </a:fld>
             <a:endParaRPr lang="en-US"/>
           </a:p>
@@ -2333,7 +2565,7 @@
           <a:p>
             <a:fld id="{93C8B963-0F36-48FC-991E-AA63861DA924}" type="datetimeFigureOut">
               <a:rPr lang="en-US" smtClean="0"/>
-              <a:t>9/6/2023</a:t>
+              <a:t>9/12/2023</a:t>
             </a:fld>
             <a:endParaRPr lang="en-US"/>
           </a:p>
@@ -2757,7 +2989,7 @@
           <a:p>
             <a:fld id="{93C8B963-0F36-48FC-991E-AA63861DA924}" type="datetimeFigureOut">
               <a:rPr lang="en-US" smtClean="0"/>
-              <a:t>9/6/2023</a:t>
+              <a:t>9/12/2023</a:t>
             </a:fld>
             <a:endParaRPr lang="en-US"/>
           </a:p>
@@ -3294,7 +3526,7 @@
           <a:p>
             <a:fld id="{93C8B963-0F36-48FC-991E-AA63861DA924}" type="datetimeFigureOut">
               <a:rPr lang="en-US" smtClean="0"/>
-              <a:t>9/6/2023</a:t>
+              <a:t>9/12/2023</a:t>
             </a:fld>
             <a:endParaRPr lang="en-US"/>
           </a:p>
@@ -4158,7 +4390,7 @@
           <a:p>
             <a:fld id="{93C8B963-0F36-48FC-991E-AA63861DA924}" type="datetimeFigureOut">
               <a:rPr lang="en-US" smtClean="0"/>
-              <a:t>9/6/2023</a:t>
+              <a:t>9/12/2023</a:t>
             </a:fld>
             <a:endParaRPr lang="en-US"/>
           </a:p>
@@ -4328,7 +4560,7 @@
           <a:p>
             <a:fld id="{93C8B963-0F36-48FC-991E-AA63861DA924}" type="datetimeFigureOut">
               <a:rPr lang="en-US" smtClean="0"/>
-              <a:t>9/6/2023</a:t>
+              <a:t>9/12/2023</a:t>
             </a:fld>
             <a:endParaRPr lang="en-US"/>
           </a:p>
@@ -4512,7 +4744,7 @@
           <a:p>
             <a:fld id="{93C8B963-0F36-48FC-991E-AA63861DA924}" type="datetimeFigureOut">
               <a:rPr lang="en-US" smtClean="0"/>
-              <a:t>9/6/2023</a:t>
+              <a:t>9/12/2023</a:t>
             </a:fld>
             <a:endParaRPr lang="en-US"/>
           </a:p>
@@ -4682,7 +4914,7 @@
           <a:p>
             <a:fld id="{93C8B963-0F36-48FC-991E-AA63861DA924}" type="datetimeFigureOut">
               <a:rPr lang="en-US" smtClean="0"/>
-              <a:t>9/6/2023</a:t>
+              <a:t>9/12/2023</a:t>
             </a:fld>
             <a:endParaRPr lang="en-US"/>
           </a:p>
@@ -4926,7 +5158,7 @@
           <a:p>
             <a:fld id="{93C8B963-0F36-48FC-991E-AA63861DA924}" type="datetimeFigureOut">
               <a:rPr lang="en-US" smtClean="0"/>
-              <a:t>9/6/2023</a:t>
+              <a:t>9/12/2023</a:t>
             </a:fld>
             <a:endParaRPr lang="en-US"/>
           </a:p>
@@ -5162,7 +5394,7 @@
           <a:p>
             <a:fld id="{93C8B963-0F36-48FC-991E-AA63861DA924}" type="datetimeFigureOut">
               <a:rPr lang="en-US" smtClean="0"/>
-              <a:t>9/6/2023</a:t>
+              <a:t>9/12/2023</a:t>
             </a:fld>
             <a:endParaRPr lang="en-US"/>
           </a:p>
@@ -5628,7 +5860,7 @@
           <a:p>
             <a:fld id="{93C8B963-0F36-48FC-991E-AA63861DA924}" type="datetimeFigureOut">
               <a:rPr lang="en-US" smtClean="0"/>
-              <a:t>9/6/2023</a:t>
+              <a:t>9/12/2023</a:t>
             </a:fld>
             <a:endParaRPr lang="en-US"/>
           </a:p>
@@ -5746,7 +5978,7 @@
           <a:p>
             <a:fld id="{93C8B963-0F36-48FC-991E-AA63861DA924}" type="datetimeFigureOut">
               <a:rPr lang="en-US" smtClean="0"/>
-              <a:t>9/6/2023</a:t>
+              <a:t>9/12/2023</a:t>
             </a:fld>
             <a:endParaRPr lang="en-US"/>
           </a:p>
@@ -5841,7 +6073,7 @@
           <a:p>
             <a:fld id="{93C8B963-0F36-48FC-991E-AA63861DA924}" type="datetimeFigureOut">
               <a:rPr lang="en-US" smtClean="0"/>
-              <a:t>9/6/2023</a:t>
+              <a:t>9/12/2023</a:t>
             </a:fld>
             <a:endParaRPr lang="en-US"/>
           </a:p>
@@ -6096,7 +6328,7 @@
           <a:p>
             <a:fld id="{93C8B963-0F36-48FC-991E-AA63861DA924}" type="datetimeFigureOut">
               <a:rPr lang="en-US" smtClean="0"/>
-              <a:t>9/6/2023</a:t>
+              <a:t>9/12/2023</a:t>
             </a:fld>
             <a:endParaRPr lang="en-US"/>
           </a:p>
@@ -6396,7 +6628,7 @@
           <a:p>
             <a:fld id="{93C8B963-0F36-48FC-991E-AA63861DA924}" type="datetimeFigureOut">
               <a:rPr lang="en-US" smtClean="0"/>
-              <a:t>9/6/2023</a:t>
+              <a:t>9/12/2023</a:t>
             </a:fld>
             <a:endParaRPr lang="en-US"/>
           </a:p>
@@ -6630,7 +6862,7 @@
           <a:p>
             <a:fld id="{93C8B963-0F36-48FC-991E-AA63861DA924}" type="datetimeFigureOut">
               <a:rPr lang="en-US" smtClean="0"/>
-              <a:t>9/6/2023</a:t>
+              <a:t>9/12/2023</a:t>
             </a:fld>
             <a:endParaRPr lang="en-US"/>
           </a:p>
@@ -7424,6 +7656,362 @@
 </file>
 
 <file path=ppt/slides/slide10.xml><?xml version="1.0" encoding="utf-8"?>
+<p:sld xmlns:a="http://schemas.openxmlformats.org/drawingml/2006/main" xmlns:r="http://schemas.openxmlformats.org/officeDocument/2006/relationships" xmlns:p="http://schemas.openxmlformats.org/presentationml/2006/main">
+  <p:cSld>
+    <p:spTree>
+      <p:nvGrpSpPr>
+        <p:cNvPr id="1" name="Shape 118"/>
+        <p:cNvGrpSpPr/>
+        <p:nvPr/>
+      </p:nvGrpSpPr>
+      <p:grpSpPr>
+        <a:xfrm>
+          <a:off x="0" y="0"/>
+          <a:ext cx="0" cy="0"/>
+          <a:chOff x="0" y="0"/>
+          <a:chExt cx="0" cy="0"/>
+        </a:xfrm>
+      </p:grpSpPr>
+      <p:sp>
+        <p:nvSpPr>
+          <p:cNvPr id="11" name="Shape 120">
+            <a:extLst>
+              <a:ext uri="{FF2B5EF4-FFF2-40B4-BE49-F238E27FC236}">
+                <a16:creationId xmlns:a16="http://schemas.microsoft.com/office/drawing/2014/main" id="{40EC573B-C7E2-4CA8-8C16-EB7E1E421CDE}"/>
+              </a:ext>
+            </a:extLst>
+          </p:cNvPr>
+          <p:cNvSpPr txBox="1"/>
+          <p:nvPr/>
+        </p:nvSpPr>
+        <p:spPr>
+          <a:xfrm>
+            <a:off x="307652" y="164839"/>
+            <a:ext cx="9255798" cy="707886"/>
+          </a:xfrm>
+          <a:prstGeom prst="rect">
+            <a:avLst/>
+          </a:prstGeom>
+          <a:noFill/>
+          <a:ln>
+            <a:noFill/>
+          </a:ln>
+        </p:spPr>
+        <p:txBody>
+          <a:bodyPr lIns="91425" tIns="45700" rIns="91425" bIns="45700" anchor="t" anchorCtr="0">
+            <a:noAutofit/>
+          </a:bodyPr>
+          <a:lstStyle/>
+          <a:p>
+            <a:pPr>
+              <a:buSzPct val="25000"/>
+            </a:pPr>
+            <a:r>
+              <a:rPr lang="en-US" sz="4000" b="1" dirty="0">
+                <a:solidFill>
+                  <a:schemeClr val="tx1">
+                    <a:lumMod val="85000"/>
+                    <a:lumOff val="15000"/>
+                  </a:schemeClr>
+                </a:solidFill>
+                <a:ea typeface="Calibri"/>
+                <a:cs typeface="Calibri"/>
+                <a:sym typeface="Calibri"/>
+              </a:rPr>
+              <a:t>You try it!</a:t>
+            </a:r>
+          </a:p>
+        </p:txBody>
+      </p:sp>
+      <p:sp>
+        <p:nvSpPr>
+          <p:cNvPr id="3" name="Rectangle 2">
+            <a:extLst>
+              <a:ext uri="{FF2B5EF4-FFF2-40B4-BE49-F238E27FC236}">
+                <a16:creationId xmlns:a16="http://schemas.microsoft.com/office/drawing/2014/main" id="{C0B0F76B-2B24-44D4-9139-AE2D920659AB}"/>
+              </a:ext>
+            </a:extLst>
+          </p:cNvPr>
+          <p:cNvSpPr/>
+          <p:nvPr/>
+        </p:nvSpPr>
+        <p:spPr>
+          <a:xfrm>
+            <a:off x="580041" y="856357"/>
+            <a:ext cx="10802957" cy="6124754"/>
+          </a:xfrm>
+          <a:prstGeom prst="rect">
+            <a:avLst/>
+          </a:prstGeom>
+        </p:spPr>
+        <p:txBody>
+          <a:bodyPr wrap="square">
+            <a:spAutoFit/>
+          </a:bodyPr>
+          <a:lstStyle/>
+          <a:p>
+            <a:pPr>
+              <a:buSzPct val="25000"/>
+            </a:pPr>
+            <a:r>
+              <a:rPr lang="en-US" sz="2800" dirty="0">
+                <a:ea typeface="Calibri"/>
+                <a:cs typeface="Calibri"/>
+                <a:sym typeface="Calibri"/>
+              </a:rPr>
+              <a:t>Create dummy variables (0/1) that flag your “low education” county</a:t>
+            </a:r>
+          </a:p>
+          <a:p>
+            <a:pPr>
+              <a:buSzPct val="25000"/>
+            </a:pPr>
+            <a:endParaRPr lang="en-US" sz="2800" dirty="0">
+              <a:ea typeface="Calibri"/>
+              <a:cs typeface="Calibri"/>
+              <a:sym typeface="Calibri"/>
+            </a:endParaRPr>
+          </a:p>
+          <a:p>
+            <a:pPr marL="457200" indent="-457200">
+              <a:buSzPct val="100000"/>
+              <a:buFont typeface="Arial" panose="020B0604020202020204" pitchFamily="34" charset="0"/>
+              <a:buChar char="•"/>
+            </a:pPr>
+            <a:r>
+              <a:rPr lang="en-US" sz="2800" dirty="0">
+                <a:ea typeface="Calibri"/>
+                <a:cs typeface="Calibri"/>
+                <a:sym typeface="Calibri"/>
+              </a:rPr>
+              <a:t>Group 1: Identify counties in the top quartile for not completing high school (</a:t>
+            </a:r>
+            <a:r>
+              <a:rPr lang="en-US" sz="2800" dirty="0" err="1">
+                <a:ea typeface="Calibri"/>
+                <a:cs typeface="Calibri"/>
+                <a:sym typeface="Calibri"/>
+              </a:rPr>
+              <a:t>LessHSPct</a:t>
+            </a:r>
+            <a:r>
+              <a:rPr lang="en-US" sz="2800" dirty="0">
+                <a:ea typeface="Calibri"/>
+                <a:cs typeface="Calibri"/>
+                <a:sym typeface="Calibri"/>
+              </a:rPr>
+              <a:t>)</a:t>
+            </a:r>
+          </a:p>
+          <a:p>
+            <a:pPr marL="457200" indent="-457200">
+              <a:buSzPct val="100000"/>
+              <a:buFont typeface="Arial" panose="020B0604020202020204" pitchFamily="34" charset="0"/>
+              <a:buChar char="•"/>
+            </a:pPr>
+            <a:r>
+              <a:rPr lang="en-US" sz="2800" dirty="0">
+                <a:ea typeface="Calibri"/>
+                <a:cs typeface="Calibri"/>
+                <a:sym typeface="Calibri"/>
+              </a:rPr>
+              <a:t>Group 2: Use the </a:t>
+            </a:r>
+            <a:r>
+              <a:rPr lang="en-US" sz="2800" dirty="0" err="1">
+                <a:ea typeface="Calibri"/>
+                <a:cs typeface="Calibri"/>
+                <a:sym typeface="Calibri"/>
+              </a:rPr>
+              <a:t>LessHSPct</a:t>
+            </a:r>
+            <a:r>
+              <a:rPr lang="en-US" sz="2800" dirty="0">
+                <a:ea typeface="Calibri"/>
+                <a:cs typeface="Calibri"/>
+                <a:sym typeface="Calibri"/>
+              </a:rPr>
+              <a:t> and </a:t>
+            </a:r>
+            <a:r>
+              <a:rPr lang="en-US" sz="2800" dirty="0" err="1">
+                <a:ea typeface="Calibri"/>
+                <a:cs typeface="Calibri"/>
+                <a:sym typeface="Calibri"/>
+              </a:rPr>
+              <a:t>HSGradPct</a:t>
+            </a:r>
+            <a:r>
+              <a:rPr lang="en-US" sz="2800" dirty="0">
+                <a:ea typeface="Calibri"/>
+                <a:cs typeface="Calibri"/>
+                <a:sym typeface="Calibri"/>
+              </a:rPr>
+              <a:t> variables. Identify counties in the top quartile for this figure.</a:t>
+            </a:r>
+          </a:p>
+          <a:p>
+            <a:pPr marL="457200" indent="-457200">
+              <a:buSzPct val="100000"/>
+              <a:buFont typeface="Arial" panose="020B0604020202020204" pitchFamily="34" charset="0"/>
+              <a:buChar char="•"/>
+            </a:pPr>
+            <a:r>
+              <a:rPr lang="en-US" sz="2800" dirty="0">
+                <a:ea typeface="Calibri"/>
+                <a:cs typeface="Calibri"/>
+                <a:sym typeface="Calibri"/>
+              </a:rPr>
+              <a:t>Group 3: Identify counties more than 2 standard deviations higher than the mean for </a:t>
+            </a:r>
+            <a:r>
+              <a:rPr lang="en-US" sz="2800" dirty="0" err="1">
+                <a:ea typeface="Calibri"/>
+                <a:cs typeface="Calibri"/>
+                <a:sym typeface="Calibri"/>
+              </a:rPr>
+              <a:t>LessHSPct</a:t>
+            </a:r>
+            <a:endParaRPr lang="en-US" sz="2800" dirty="0">
+              <a:ea typeface="Calibri"/>
+              <a:cs typeface="Calibri"/>
+              <a:sym typeface="Calibri"/>
+            </a:endParaRPr>
+          </a:p>
+          <a:p>
+            <a:pPr marL="457200" indent="-457200">
+              <a:buSzPct val="100000"/>
+              <a:buFont typeface="Arial" panose="020B0604020202020204" pitchFamily="34" charset="0"/>
+              <a:buChar char="•"/>
+            </a:pPr>
+            <a:r>
+              <a:rPr lang="en-US" sz="2800" dirty="0">
+                <a:ea typeface="Calibri"/>
+                <a:cs typeface="Calibri"/>
+                <a:sym typeface="Calibri"/>
+              </a:rPr>
+              <a:t>Group 4: Use the </a:t>
+            </a:r>
+            <a:r>
+              <a:rPr lang="en-US" sz="2800" dirty="0" err="1">
+                <a:ea typeface="Calibri"/>
+                <a:cs typeface="Calibri"/>
+                <a:sym typeface="Calibri"/>
+              </a:rPr>
+              <a:t>LessHSPct</a:t>
+            </a:r>
+            <a:r>
+              <a:rPr lang="en-US" sz="2800" dirty="0">
+                <a:ea typeface="Calibri"/>
+                <a:cs typeface="Calibri"/>
+                <a:sym typeface="Calibri"/>
+              </a:rPr>
+              <a:t> and </a:t>
+            </a:r>
+            <a:r>
+              <a:rPr lang="en-US" sz="2800" dirty="0" err="1">
+                <a:ea typeface="Calibri"/>
+                <a:cs typeface="Calibri"/>
+                <a:sym typeface="Calibri"/>
+              </a:rPr>
+              <a:t>HSGradPct</a:t>
+            </a:r>
+            <a:r>
+              <a:rPr lang="en-US" sz="2800" dirty="0">
+                <a:ea typeface="Calibri"/>
+                <a:cs typeface="Calibri"/>
+                <a:sym typeface="Calibri"/>
+              </a:rPr>
+              <a:t> variables. Identify counties more than 2 standard deviations above the mean.</a:t>
+            </a:r>
+          </a:p>
+          <a:p>
+            <a:pPr marL="457200" indent="-457200">
+              <a:buSzPct val="100000"/>
+              <a:buFont typeface="Arial" panose="020B0604020202020204" pitchFamily="34" charset="0"/>
+              <a:buChar char="•"/>
+            </a:pPr>
+            <a:r>
+              <a:rPr lang="en-US" sz="2800" dirty="0">
+                <a:ea typeface="Calibri"/>
+                <a:cs typeface="Calibri"/>
+                <a:sym typeface="Calibri"/>
+              </a:rPr>
+              <a:t>Group 5: Identify upper outliers for the </a:t>
+            </a:r>
+            <a:r>
+              <a:rPr lang="en-US" sz="2800" dirty="0" err="1">
+                <a:ea typeface="Calibri"/>
+                <a:cs typeface="Calibri"/>
+                <a:sym typeface="Calibri"/>
+              </a:rPr>
+              <a:t>LessHSPct</a:t>
+            </a:r>
+            <a:r>
+              <a:rPr lang="en-US" sz="2800" dirty="0">
+                <a:ea typeface="Calibri"/>
+                <a:cs typeface="Calibri"/>
+                <a:sym typeface="Calibri"/>
+              </a:rPr>
+              <a:t> variable. The threshold is the 3</a:t>
+            </a:r>
+            <a:r>
+              <a:rPr lang="en-US" sz="2800" baseline="30000" dirty="0">
+                <a:ea typeface="Calibri"/>
+                <a:cs typeface="Calibri"/>
+                <a:sym typeface="Calibri"/>
+              </a:rPr>
+              <a:t>rd</a:t>
+            </a:r>
+            <a:r>
+              <a:rPr lang="en-US" sz="2800" dirty="0">
+                <a:ea typeface="Calibri"/>
+                <a:cs typeface="Calibri"/>
+                <a:sym typeface="Calibri"/>
+              </a:rPr>
+              <a:t> quartile value + 1.5 * the IQR </a:t>
+            </a:r>
+          </a:p>
+          <a:p>
+            <a:pPr marL="457200" indent="-457200">
+              <a:buSzPct val="100000"/>
+              <a:buFont typeface="Arial" panose="020B0604020202020204" pitchFamily="34" charset="0"/>
+              <a:buChar char="•"/>
+            </a:pPr>
+            <a:endParaRPr lang="en-US" sz="2800" dirty="0">
+              <a:ea typeface="Calibri"/>
+              <a:cs typeface="Calibri"/>
+              <a:sym typeface="Calibri"/>
+            </a:endParaRPr>
+          </a:p>
+          <a:p>
+            <a:pPr marL="457200" indent="-457200">
+              <a:buSzPct val="100000"/>
+              <a:buFont typeface="Arial" panose="020B0604020202020204" pitchFamily="34" charset="0"/>
+              <a:buChar char="•"/>
+            </a:pPr>
+            <a:endParaRPr lang="en-US" sz="2800" dirty="0">
+              <a:ea typeface="Calibri"/>
+              <a:cs typeface="Calibri"/>
+              <a:sym typeface="Calibri"/>
+            </a:endParaRPr>
+          </a:p>
+        </p:txBody>
+      </p:sp>
+    </p:spTree>
+    <p:extLst>
+      <p:ext uri="{BB962C8B-B14F-4D97-AF65-F5344CB8AC3E}">
+        <p14:creationId xmlns:p14="http://schemas.microsoft.com/office/powerpoint/2010/main" val="133495747"/>
+      </p:ext>
+    </p:extLst>
+  </p:cSld>
+  <p:clrMapOvr>
+    <a:masterClrMapping/>
+  </p:clrMapOvr>
+</p:sld>
+</file>
+
+<file path=ppt/slides/slide11.xml><?xml version="1.0" encoding="utf-8"?>
 <p:sld xmlns:a="http://schemas.openxmlformats.org/drawingml/2006/main" xmlns:r="http://schemas.openxmlformats.org/officeDocument/2006/relationships" xmlns:p="http://schemas.openxmlformats.org/presentationml/2006/main">
   <p:cSld>
     <p:spTree>
@@ -9420,8 +10008,8 @@
           </a:p>
         </p:txBody>
       </p:sp>
-      <mc:AlternateContent xmlns:mc="http://schemas.openxmlformats.org/markup-compatibility/2006">
-        <mc:Choice xmlns:a14="http://schemas.microsoft.com/office/drawing/2010/main" Requires="a14">
+      <mc:AlternateContent xmlns:mc="http://schemas.openxmlformats.org/markup-compatibility/2006" xmlns:a14="http://schemas.microsoft.com/office/drawing/2010/main">
+        <mc:Choice Requires="a14">
           <p:sp>
             <p:nvSpPr>
               <p:cNvPr id="5" name="TextBox 4">
@@ -9557,7 +10145,7 @@
             </p:txBody>
           </p:sp>
         </mc:Choice>
-        <mc:Fallback>
+        <mc:Fallback xmlns="">
           <p:sp>
             <p:nvSpPr>
               <p:cNvPr id="5" name="TextBox 4">
@@ -9617,7 +10205,7 @@
         <p:spPr>
           <a:xfrm>
             <a:off x="494951" y="1096753"/>
-            <a:ext cx="6535023" cy="1815882"/>
+            <a:ext cx="10746297" cy="1384995"/>
           </a:xfrm>
           <a:prstGeom prst="rect">
             <a:avLst/>
@@ -10229,20 +10817,6 @@
               <a:buSzPct val="25000"/>
             </a:pPr>
             <a:r>
-              <a:rPr lang="en-US" sz="4000" b="1" dirty="0" err="1">
-                <a:solidFill>
-                  <a:schemeClr val="tx1">
-                    <a:lumMod val="85000"/>
-                    <a:lumOff val="15000"/>
-                  </a:schemeClr>
-                </a:solidFill>
-                <a:ea typeface="Calibri"/>
-                <a:cs typeface="Calibri"/>
-                <a:sym typeface="Calibri"/>
-              </a:rPr>
-              <a:t>Desriptive</a:t>
-            </a:r>
-            <a:r>
               <a:rPr lang="en-US" sz="4000" b="1" dirty="0">
                 <a:solidFill>
                   <a:schemeClr val="tx1">
@@ -10254,7 +10828,7 @@
                 <a:cs typeface="Calibri"/>
                 <a:sym typeface="Calibri"/>
               </a:rPr>
-              <a:t> states in action: </a:t>
+              <a:t>Descriptive stats in action: </a:t>
             </a:r>
           </a:p>
           <a:p>
@@ -10262,7 +10836,7 @@
               <a:buSzPct val="25000"/>
             </a:pPr>
             <a:r>
-              <a:rPr lang="en-US" sz="4000" b="1" dirty="0">
+              <a:rPr lang="en-US" sz="2800" dirty="0">
                 <a:solidFill>
                   <a:schemeClr val="tx1">
                     <a:lumMod val="85000"/>
@@ -10274,6 +10848,25 @@
                 <a:sym typeface="Calibri"/>
               </a:rPr>
               <a:t>What’s a “low education county?”</a:t>
+            </a:r>
+          </a:p>
+          <a:p>
+            <a:pPr>
+              <a:buSzPct val="25000"/>
+            </a:pPr>
+            <a:r>
+              <a:rPr lang="en-US" sz="2800" dirty="0">
+                <a:solidFill>
+                  <a:schemeClr val="tx1">
+                    <a:lumMod val="85000"/>
+                    <a:lumOff val="15000"/>
+                  </a:schemeClr>
+                </a:solidFill>
+                <a:ea typeface="Calibri"/>
+                <a:cs typeface="Calibri"/>
+                <a:sym typeface="Calibri"/>
+              </a:rPr>
+              <a:t>Use our census education variables</a:t>
             </a:r>
           </a:p>
         </p:txBody>
@@ -10306,8 +10899,8 @@
         </p:blipFill>
         <p:spPr>
           <a:xfrm>
-            <a:off x="2825790" y="1674535"/>
-            <a:ext cx="7852271" cy="5018625"/>
+            <a:off x="2241821" y="1833626"/>
+            <a:ext cx="7708358" cy="4926646"/>
           </a:xfrm>
           <a:prstGeom prst="rect">
             <a:avLst/>
@@ -10613,7 +11206,7 @@
                 <a:cs typeface="Calibri"/>
                 <a:sym typeface="Calibri"/>
               </a:rPr>
-              <a:t>You try it!</a:t>
+              <a:t>Some useful Excel functions</a:t>
             </a:r>
           </a:p>
         </p:txBody>
@@ -10632,41 +11225,18 @@
         </p:nvSpPr>
         <p:spPr>
           <a:xfrm>
-            <a:off x="580041" y="856357"/>
-            <a:ext cx="10802957" cy="6124754"/>
+            <a:off x="827869" y="1054808"/>
+            <a:ext cx="10014408" cy="3046988"/>
           </a:xfrm>
           <a:prstGeom prst="rect">
             <a:avLst/>
           </a:prstGeom>
         </p:spPr>
         <p:txBody>
-          <a:bodyPr wrap="square">
+          <a:bodyPr wrap="none">
             <a:spAutoFit/>
           </a:bodyPr>
           <a:lstStyle/>
-          <a:p>
-            <a:pPr>
-              <a:buSzPct val="25000"/>
-            </a:pPr>
-            <a:r>
-              <a:rPr lang="en-US" sz="2800" dirty="0">
-                <a:ea typeface="Calibri"/>
-                <a:cs typeface="Calibri"/>
-                <a:sym typeface="Calibri"/>
-              </a:rPr>
-              <a:t>Use the education data you created earlier:</a:t>
-            </a:r>
-          </a:p>
-          <a:p>
-            <a:pPr>
-              <a:buSzPct val="25000"/>
-            </a:pPr>
-            <a:endParaRPr lang="en-US" sz="2800" dirty="0">
-              <a:ea typeface="Calibri"/>
-              <a:cs typeface="Calibri"/>
-              <a:sym typeface="Calibri"/>
-            </a:endParaRPr>
-          </a:p>
           <a:p>
             <a:pPr marL="457200" indent="-457200">
               <a:buSzPct val="100000"/>
@@ -10674,28 +11244,12 @@
               <a:buChar char="•"/>
             </a:pPr>
             <a:r>
-              <a:rPr lang="en-US" sz="2800" dirty="0">
+              <a:rPr lang="en-US" sz="3200" dirty="0">
                 <a:ea typeface="Calibri"/>
                 <a:cs typeface="Calibri"/>
                 <a:sym typeface="Calibri"/>
               </a:rPr>
-              <a:t>Group 1: Identify counties in the top quartile for not completing high school (</a:t>
-            </a:r>
-            <a:r>
-              <a:rPr lang="en-US" sz="2800" dirty="0" err="1">
-                <a:ea typeface="Calibri"/>
-                <a:cs typeface="Calibri"/>
-                <a:sym typeface="Calibri"/>
-              </a:rPr>
-              <a:t>LessHSPct</a:t>
-            </a:r>
-            <a:r>
-              <a:rPr lang="en-US" sz="2800" dirty="0">
-                <a:ea typeface="Calibri"/>
-                <a:cs typeface="Calibri"/>
-                <a:sym typeface="Calibri"/>
-              </a:rPr>
-              <a:t>)</a:t>
+              <a:t>Average (mean)</a:t>
             </a:r>
           </a:p>
           <a:p>
@@ -10705,44 +11259,12 @@
               <a:buChar char="•"/>
             </a:pPr>
             <a:r>
-              <a:rPr lang="en-US" sz="2800" dirty="0">
+              <a:rPr lang="en-US" sz="3200" dirty="0">
                 <a:ea typeface="Calibri"/>
                 <a:cs typeface="Calibri"/>
                 <a:sym typeface="Calibri"/>
               </a:rPr>
-              <a:t>Group 2: Use the </a:t>
-            </a:r>
-            <a:r>
-              <a:rPr lang="en-US" sz="2800" dirty="0" err="1">
-                <a:ea typeface="Calibri"/>
-                <a:cs typeface="Calibri"/>
-                <a:sym typeface="Calibri"/>
-              </a:rPr>
-              <a:t>LessHSPct</a:t>
-            </a:r>
-            <a:r>
-              <a:rPr lang="en-US" sz="2800" dirty="0">
-                <a:ea typeface="Calibri"/>
-                <a:cs typeface="Calibri"/>
-                <a:sym typeface="Calibri"/>
-              </a:rPr>
-              <a:t> and </a:t>
-            </a:r>
-            <a:r>
-              <a:rPr lang="en-US" sz="2800" dirty="0" err="1">
-                <a:ea typeface="Calibri"/>
-                <a:cs typeface="Calibri"/>
-                <a:sym typeface="Calibri"/>
-              </a:rPr>
-              <a:t>HSGradPct</a:t>
-            </a:r>
-            <a:r>
-              <a:rPr lang="en-US" sz="2800" dirty="0">
-                <a:ea typeface="Calibri"/>
-                <a:cs typeface="Calibri"/>
-                <a:sym typeface="Calibri"/>
-              </a:rPr>
-              <a:t> variables. Identify counties in the top quartile for this figure.</a:t>
+              <a:t>Median</a:t>
             </a:r>
           </a:p>
           <a:p>
@@ -10752,26 +11274,13 @@
               <a:buChar char="•"/>
             </a:pPr>
             <a:r>
-              <a:rPr lang="en-US" sz="2800" dirty="0">
+              <a:rPr lang="en-US" sz="3200" dirty="0">
                 <a:ea typeface="Calibri"/>
                 <a:cs typeface="Calibri"/>
                 <a:sym typeface="Calibri"/>
               </a:rPr>
-              <a:t>Group 3: Identify counties more than 2 standard deviations higher than the mean for </a:t>
-            </a:r>
-            <a:r>
-              <a:rPr lang="en-US" sz="2800" dirty="0" err="1">
-                <a:ea typeface="Calibri"/>
-                <a:cs typeface="Calibri"/>
-                <a:sym typeface="Calibri"/>
-              </a:rPr>
-              <a:t>LessHSPct</a:t>
-            </a:r>
-            <a:endParaRPr lang="en-US" sz="2800" dirty="0">
-              <a:ea typeface="Calibri"/>
-              <a:cs typeface="Calibri"/>
-              <a:sym typeface="Calibri"/>
-            </a:endParaRPr>
+              <a:t>Quartile (choose which quartile: 1=25%, 2=50%, etc.)</a:t>
+            </a:r>
           </a:p>
           <a:p>
             <a:pPr marL="457200" indent="-457200">
@@ -10780,44 +11289,20 @@
               <a:buChar char="•"/>
             </a:pPr>
             <a:r>
-              <a:rPr lang="en-US" sz="2800" dirty="0">
+              <a:rPr lang="en-US" sz="3200" dirty="0" err="1">
                 <a:ea typeface="Calibri"/>
                 <a:cs typeface="Calibri"/>
                 <a:sym typeface="Calibri"/>
               </a:rPr>
-              <a:t>Group 4: Use the </a:t>
-            </a:r>
-            <a:r>
-              <a:rPr lang="en-US" sz="2800" dirty="0" err="1">
+              <a:t>Stdev</a:t>
+            </a:r>
+            <a:r>
+              <a:rPr lang="en-US" sz="3200" dirty="0">
                 <a:ea typeface="Calibri"/>
                 <a:cs typeface="Calibri"/>
                 <a:sym typeface="Calibri"/>
               </a:rPr>
-              <a:t>LessHSPct</a:t>
-            </a:r>
-            <a:r>
-              <a:rPr lang="en-US" sz="2800" dirty="0">
-                <a:ea typeface="Calibri"/>
-                <a:cs typeface="Calibri"/>
-                <a:sym typeface="Calibri"/>
-              </a:rPr>
-              <a:t> and </a:t>
-            </a:r>
-            <a:r>
-              <a:rPr lang="en-US" sz="2800" dirty="0" err="1">
-                <a:ea typeface="Calibri"/>
-                <a:cs typeface="Calibri"/>
-                <a:sym typeface="Calibri"/>
-              </a:rPr>
-              <a:t>HSGradPct</a:t>
-            </a:r>
-            <a:r>
-              <a:rPr lang="en-US" sz="2800" dirty="0">
-                <a:ea typeface="Calibri"/>
-                <a:cs typeface="Calibri"/>
-                <a:sym typeface="Calibri"/>
-              </a:rPr>
-              <a:t> variables. Identify counties more than 2 standard deviations above the mean.</a:t>
+              <a:t> (standard deviation)</a:t>
             </a:r>
           </a:p>
           <a:p>
@@ -10826,46 +11311,11 @@
               <a:buFont typeface="Arial" panose="020B0604020202020204" pitchFamily="34" charset="0"/>
               <a:buChar char="•"/>
             </a:pPr>
-            <a:r>
-              <a:rPr lang="en-US" sz="2800" dirty="0">
-                <a:ea typeface="Calibri"/>
-                <a:cs typeface="Calibri"/>
-                <a:sym typeface="Calibri"/>
-              </a:rPr>
-              <a:t>Group 5: Identify upper outliers for the </a:t>
-            </a:r>
-            <a:r>
-              <a:rPr lang="en-US" sz="2800" dirty="0" err="1">
-                <a:ea typeface="Calibri"/>
-                <a:cs typeface="Calibri"/>
-                <a:sym typeface="Calibri"/>
-              </a:rPr>
-              <a:t>LessHSPct</a:t>
-            </a:r>
-            <a:r>
-              <a:rPr lang="en-US" sz="2800" dirty="0">
-                <a:ea typeface="Calibri"/>
-                <a:cs typeface="Calibri"/>
-                <a:sym typeface="Calibri"/>
-              </a:rPr>
-              <a:t> variable. The threshold is the 3</a:t>
-            </a:r>
-            <a:r>
-              <a:rPr lang="en-US" sz="2800" baseline="30000" dirty="0">
-                <a:ea typeface="Calibri"/>
-                <a:cs typeface="Calibri"/>
-                <a:sym typeface="Calibri"/>
-              </a:rPr>
-              <a:t>rd</a:t>
-            </a:r>
-            <a:r>
-              <a:rPr lang="en-US" sz="2800" dirty="0">
-                <a:ea typeface="Calibri"/>
-                <a:cs typeface="Calibri"/>
-                <a:sym typeface="Calibri"/>
-              </a:rPr>
-              <a:t> quartile value + 1.5 * the IQR </a:t>
-            </a:r>
+            <a:endParaRPr lang="en-US" sz="3200" dirty="0">
+              <a:ea typeface="Calibri"/>
+              <a:cs typeface="Calibri"/>
+              <a:sym typeface="Calibri"/>
+            </a:endParaRPr>
           </a:p>
           <a:p>
             <a:pPr marL="457200" indent="-457200">
@@ -10873,30 +11323,18 @@
               <a:buFont typeface="Arial" panose="020B0604020202020204" pitchFamily="34" charset="0"/>
               <a:buChar char="•"/>
             </a:pPr>
-            <a:endParaRPr lang="en-US" sz="2800" dirty="0">
+            <a:endParaRPr lang="en-US" sz="3200" dirty="0">
               <a:ea typeface="Calibri"/>
               <a:cs typeface="Calibri"/>
               <a:sym typeface="Calibri"/>
             </a:endParaRPr>
           </a:p>
-          <a:p>
-            <a:pPr marL="457200" indent="-457200">
-              <a:buSzPct val="100000"/>
-              <a:buFont typeface="Arial" panose="020B0604020202020204" pitchFamily="34" charset="0"/>
-              <a:buChar char="•"/>
-            </a:pPr>
-            <a:endParaRPr lang="en-US" sz="2800" dirty="0">
-              <a:ea typeface="Calibri"/>
-              <a:cs typeface="Calibri"/>
-              <a:sym typeface="Calibri"/>
-            </a:endParaRPr>
-          </a:p>
         </p:txBody>
       </p:sp>
     </p:spTree>
     <p:extLst>
       <p:ext uri="{BB962C8B-B14F-4D97-AF65-F5344CB8AC3E}">
-        <p14:creationId xmlns:p14="http://schemas.microsoft.com/office/powerpoint/2010/main" val="133495747"/>
+        <p14:creationId xmlns:p14="http://schemas.microsoft.com/office/powerpoint/2010/main" val="3683018772"/>
       </p:ext>
     </p:extLst>
   </p:cSld>

</xml_diff>